<commit_message>
Edited Slides for Interim Demo
</commit_message>
<xml_diff>
--- a/Documentation/Interim Demo.pptx
+++ b/Documentation/Interim Demo.pptx
@@ -110,6 +110,11 @@
       </a:defRPr>
     </a:lvl9pPr>
   </p:defaultTextStyle>
+  <p:extLst>
+    <p:ext uri="{EFAFB233-063F-42B5-8137-9DF3F51BA10A}">
+      <p15:sldGuideLst xmlns:p15="http://schemas.microsoft.com/office/powerpoint/2012/main"/>
+    </p:ext>
+  </p:extLst>
 </p:presentation>
 </file>
 
@@ -300,9 +305,7 @@
               </c:spPr>
             </c:leaderLines>
             <c:extLst>
-              <c:ext xmlns:c15="http://schemas.microsoft.com/office/drawing/2012/chart" uri="{CE6537A1-D6FC-4f65-9D91-7224C49458BB}">
-                <c15:layout/>
-              </c:ext>
+              <c:ext xmlns:c15="http://schemas.microsoft.com/office/drawing/2012/chart" uri="{CE6537A1-D6FC-4f65-9D91-7224C49458BB}"/>
             </c:extLst>
           </c:dLbls>
           <c:cat>
@@ -326,10 +329,10 @@
                 <c:formatCode>General</c:formatCode>
                 <c:ptCount val="2"/>
                 <c:pt idx="0">
-                  <c:v>70</c:v>
+                  <c:v>60</c:v>
                 </c:pt>
                 <c:pt idx="1">
-                  <c:v>30</c:v>
+                  <c:v>40</c:v>
                 </c:pt>
               </c:numCache>
             </c:numRef>
@@ -7244,8 +7247,17 @@
           <a:p>
             <a:r>
               <a:rPr lang="en-US" sz="2400" dirty="0" smtClean="0"/>
-              <a:t>Performance evaluation of Algorithm</a:t>
-            </a:r>
+              <a:t>Performance evaluation of </a:t>
+            </a:r>
+            <a:r>
+              <a:rPr lang="en-US" sz="2400" dirty="0" smtClean="0"/>
+              <a:t>Algorithm </a:t>
+            </a:r>
+            <a:r>
+              <a:rPr lang="en-US" sz="1800" dirty="0" smtClean="0"/>
+              <a:t>(with unweighted graph)</a:t>
+            </a:r>
+            <a:endParaRPr lang="en-US" sz="2400" dirty="0" smtClean="0"/>
           </a:p>
           <a:p>
             <a:pPr lvl="2"/>
@@ -7274,13 +7286,13 @@
   <p:clrMapOvr>
     <a:masterClrMapping/>
   </p:clrMapOvr>
-  <mc:AlternateContent xmlns:mc="http://schemas.openxmlformats.org/markup-compatibility/2006">
-    <mc:Choice xmlns:p14="http://schemas.microsoft.com/office/powerpoint/2010/main" Requires="p14">
+  <mc:AlternateContent xmlns:mc="http://schemas.openxmlformats.org/markup-compatibility/2006" xmlns:p14="http://schemas.microsoft.com/office/powerpoint/2010/main">
+    <mc:Choice Requires="p14">
       <p:transition spd="med" p14:dur="700">
         <p:fade/>
       </p:transition>
     </mc:Choice>
-    <mc:Fallback>
+    <mc:Fallback xmlns="">
       <p:transition spd="med">
         <p:fade/>
       </p:transition>
@@ -7390,13 +7402,13 @@
   <p:clrMapOvr>
     <a:masterClrMapping/>
   </p:clrMapOvr>
-  <mc:AlternateContent xmlns:mc="http://schemas.openxmlformats.org/markup-compatibility/2006">
-    <mc:Choice xmlns:p14="http://schemas.microsoft.com/office/powerpoint/2010/main" Requires="p14">
+  <mc:AlternateContent xmlns:mc="http://schemas.openxmlformats.org/markup-compatibility/2006" xmlns:p14="http://schemas.microsoft.com/office/powerpoint/2010/main">
+    <mc:Choice Requires="p14">
       <p:transition spd="med" p14:dur="700">
         <p:fade/>
       </p:transition>
     </mc:Choice>
-    <mc:Fallback>
+    <mc:Fallback xmlns="">
       <p:transition spd="med">
         <p:fade/>
       </p:transition>
@@ -7506,13 +7518,13 @@
   <p:clrMapOvr>
     <a:masterClrMapping/>
   </p:clrMapOvr>
-  <mc:AlternateContent xmlns:mc="http://schemas.openxmlformats.org/markup-compatibility/2006">
-    <mc:Choice xmlns:p14="http://schemas.microsoft.com/office/powerpoint/2010/main" Requires="p14">
+  <mc:AlternateContent xmlns:mc="http://schemas.openxmlformats.org/markup-compatibility/2006" xmlns:p14="http://schemas.microsoft.com/office/powerpoint/2010/main">
+    <mc:Choice Requires="p14">
       <p:transition spd="med" p14:dur="700">
         <p:fade/>
       </p:transition>
     </mc:Choice>
-    <mc:Fallback>
+    <mc:Fallback xmlns="">
       <p:transition spd="med">
         <p:fade/>
       </p:transition>
@@ -10171,13 +10183,13 @@
   <p:clrMapOvr>
     <a:masterClrMapping/>
   </p:clrMapOvr>
-  <mc:AlternateContent xmlns:mc="http://schemas.openxmlformats.org/markup-compatibility/2006">
-    <mc:Choice xmlns:p14="http://schemas.microsoft.com/office/powerpoint/2010/main" Requires="p14">
+  <mc:AlternateContent xmlns:mc="http://schemas.openxmlformats.org/markup-compatibility/2006" xmlns:p14="http://schemas.microsoft.com/office/powerpoint/2010/main">
+    <mc:Choice Requires="p14">
       <p:transition spd="med" p14:dur="700">
         <p:fade/>
       </p:transition>
     </mc:Choice>
-    <mc:Fallback>
+    <mc:Fallback xmlns="">
       <p:transition spd="med">
         <p:fade/>
       </p:transition>
@@ -10245,62 +10257,158 @@
         </p:nvSpPr>
         <p:spPr>
           <a:xfrm>
-            <a:off x="913774" y="2241580"/>
-            <a:ext cx="5106026" cy="3424107"/>
+            <a:off x="570786" y="1633490"/>
+            <a:ext cx="5839845" cy="4657581"/>
           </a:xfrm>
         </p:spPr>
         <p:txBody>
           <a:bodyPr>
-            <a:normAutofit fontScale="92500" lnSpcReduction="20000"/>
+            <a:noAutofit/>
           </a:bodyPr>
           <a:lstStyle/>
           <a:p>
             <a:r>
-              <a:rPr lang="en-US" sz="2400" dirty="0" smtClean="0"/>
-              <a:t>Implementation</a:t>
-            </a:r>
+              <a:rPr lang="en-US" sz="1600" dirty="0" smtClean="0"/>
+              <a:t>Implementation </a:t>
+            </a:r>
+            <a:endParaRPr lang="en-US" sz="1600" dirty="0" smtClean="0"/>
           </a:p>
           <a:p>
             <a:pPr marL="0" indent="0">
               <a:buNone/>
             </a:pPr>
-            <a:endParaRPr lang="en-US" sz="2400" dirty="0" smtClean="0"/>
-          </a:p>
-          <a:p>
-            <a:r>
-              <a:rPr lang="en-US" sz="2400" dirty="0" smtClean="0"/>
-              <a:t>Run-time complexity analysis</a:t>
-            </a:r>
+            <a:endParaRPr lang="en-US" sz="1600" dirty="0" smtClean="0"/>
+          </a:p>
+          <a:p>
+            <a:r>
+              <a:rPr lang="en-US" sz="1600" dirty="0" smtClean="0"/>
+              <a:t>Run-time complexity </a:t>
+            </a:r>
+            <a:r>
+              <a:rPr lang="en-US" sz="1600" dirty="0" smtClean="0"/>
+              <a:t>analysis (with un-weighted graph)</a:t>
+            </a:r>
+            <a:endParaRPr lang="en-US" sz="1600" dirty="0" smtClean="0"/>
           </a:p>
           <a:p>
             <a:pPr marL="0" indent="0">
               <a:buNone/>
             </a:pPr>
-            <a:endParaRPr lang="en-US" sz="2400" dirty="0" smtClean="0"/>
-          </a:p>
-          <a:p>
-            <a:r>
-              <a:rPr lang="en-US" sz="2400" dirty="0" smtClean="0"/>
-              <a:t>Space Complexity analysis</a:t>
+            <a:endParaRPr lang="en-US" sz="1600" dirty="0" smtClean="0"/>
+          </a:p>
+          <a:p>
+            <a:r>
+              <a:rPr lang="en-US" sz="1600" dirty="0" smtClean="0"/>
+              <a:t>Space </a:t>
+            </a:r>
+            <a:r>
+              <a:rPr lang="en-US" sz="1600" dirty="0"/>
+              <a:t>Complexity </a:t>
+            </a:r>
+            <a:r>
+              <a:rPr lang="en-US" sz="1600" dirty="0" smtClean="0"/>
+              <a:t>analysis  (</a:t>
+            </a:r>
+            <a:r>
+              <a:rPr lang="en-US" sz="1600" dirty="0"/>
+              <a:t>with un-weighted graph</a:t>
+            </a:r>
+            <a:r>
+              <a:rPr lang="en-US" sz="1600" dirty="0" smtClean="0"/>
+              <a:t>)</a:t>
+            </a:r>
+          </a:p>
+          <a:p>
+            <a:endParaRPr lang="en-US" sz="1600" dirty="0" smtClean="0"/>
+          </a:p>
+          <a:p>
+            <a:r>
+              <a:rPr lang="en-US" sz="1600" dirty="0" smtClean="0"/>
+              <a:t>Validation of </a:t>
+            </a:r>
+            <a:r>
+              <a:rPr lang="en-US" sz="1600" dirty="0" smtClean="0"/>
+              <a:t>output</a:t>
             </a:r>
           </a:p>
           <a:p>
             <a:pPr marL="0" indent="0">
               <a:buNone/>
             </a:pPr>
-            <a:endParaRPr lang="en-US" sz="2400" dirty="0" smtClean="0"/>
-          </a:p>
-          <a:p>
-            <a:r>
-              <a:rPr lang="en-US" sz="2400" dirty="0" smtClean="0"/>
-              <a:t>Validation of output</a:t>
-            </a:r>
+            <a:endParaRPr lang="en-US" sz="1600" dirty="0" smtClean="0"/>
+          </a:p>
+          <a:p>
+            <a:r>
+              <a:rPr lang="en-US" sz="1600" dirty="0"/>
+              <a:t>Run-time complexity </a:t>
+            </a:r>
+            <a:r>
+              <a:rPr lang="en-US" sz="1600" dirty="0" smtClean="0"/>
+              <a:t>analysis (</a:t>
+            </a:r>
+            <a:r>
+              <a:rPr lang="en-US" sz="1600" dirty="0"/>
+              <a:t>with </a:t>
+            </a:r>
+            <a:r>
+              <a:rPr lang="en-US" sz="1600" dirty="0" smtClean="0"/>
+              <a:t>weighted </a:t>
+            </a:r>
+            <a:r>
+              <a:rPr lang="en-US" sz="1600" dirty="0"/>
+              <a:t>graph</a:t>
+            </a:r>
+            <a:r>
+              <a:rPr lang="en-US" sz="1600" dirty="0" smtClean="0"/>
+              <a:t>)</a:t>
+            </a:r>
+            <a:endParaRPr lang="en-US" sz="1600" dirty="0"/>
           </a:p>
           <a:p>
             <a:pPr marL="0" indent="0">
               <a:buNone/>
             </a:pPr>
-            <a:endParaRPr lang="en-US" dirty="0"/>
+            <a:endParaRPr lang="en-US" sz="1600" dirty="0"/>
+          </a:p>
+          <a:p>
+            <a:r>
+              <a:rPr lang="en-US" sz="1600" dirty="0"/>
+              <a:t>Space Complexity </a:t>
+            </a:r>
+            <a:r>
+              <a:rPr lang="en-US" sz="1600" dirty="0" smtClean="0"/>
+              <a:t>analysis  </a:t>
+            </a:r>
+            <a:r>
+              <a:rPr lang="en-US" sz="1600" dirty="0"/>
+              <a:t>(with </a:t>
+            </a:r>
+            <a:r>
+              <a:rPr lang="en-US" sz="1600" dirty="0" smtClean="0"/>
+              <a:t>weighted </a:t>
+            </a:r>
+            <a:r>
+              <a:rPr lang="en-US" sz="1600" dirty="0"/>
+              <a:t>graph)</a:t>
+            </a:r>
+          </a:p>
+          <a:p>
+            <a:pPr marL="0" indent="0">
+              <a:buNone/>
+            </a:pPr>
+            <a:endParaRPr lang="en-US" sz="1600" dirty="0"/>
+          </a:p>
+          <a:p>
+            <a:endParaRPr lang="en-US" sz="1600" dirty="0" smtClean="0"/>
+          </a:p>
+          <a:p>
+            <a:endParaRPr lang="en-US" sz="1600" dirty="0" smtClean="0"/>
+          </a:p>
+          <a:p>
+            <a:pPr marL="0" indent="0">
+              <a:buNone/>
+            </a:pPr>
+            <a:endParaRPr lang="en-US" sz="1600" dirty="0"/>
           </a:p>
         </p:txBody>
       </p:sp>
@@ -10314,7 +10422,7 @@
             <p:ph sz="quarter" idx="14"/>
             <p:extLst>
               <p:ext uri="{D42A27DB-BD31-4B8C-83A1-F6EECF244321}">
-                <p14:modId xmlns:p14="http://schemas.microsoft.com/office/powerpoint/2010/main" val="4036293784"/>
+                <p14:modId xmlns:p14="http://schemas.microsoft.com/office/powerpoint/2010/main" val="4188055539"/>
               </p:ext>
             </p:extLst>
           </p:nvPr>
@@ -10351,38 +10459,8 @@
         </p:blipFill>
         <p:spPr>
           <a:xfrm>
-            <a:off x="620988" y="2214694"/>
-            <a:ext cx="585572" cy="575187"/>
-          </a:xfrm>
-          <a:prstGeom prst="rect">
-            <a:avLst/>
-          </a:prstGeom>
-        </p:spPr>
-      </p:pic>
-      <p:pic>
-        <p:nvPicPr>
-          <p:cNvPr id="9" name="Picture 8" descr="Check Mark &lt;strong&gt;Tick&lt;/strong&gt; · Free vector graphic on Pixabay"/>
-          <p:cNvPicPr>
-            <a:picLocks noChangeAspect="1"/>
-          </p:cNvPicPr>
-          <p:nvPr/>
-        </p:nvPicPr>
-        <p:blipFill>
-          <a:blip r:embed="rId3">
-            <a:extLst>
-              <a:ext uri="{28A0092B-C50C-407E-A947-70E740481C1C}">
-                <a14:useLocalDpi xmlns:a14="http://schemas.microsoft.com/office/drawing/2010/main" val="0"/>
-              </a:ext>
-            </a:extLst>
-          </a:blip>
-          <a:stretch>
-            <a:fillRect/>
-          </a:stretch>
-        </p:blipFill>
-        <p:spPr>
-          <a:xfrm>
-            <a:off x="570787" y="4244960"/>
-            <a:ext cx="585572" cy="575187"/>
+            <a:off x="463452" y="1542547"/>
+            <a:ext cx="450323" cy="442336"/>
           </a:xfrm>
           <a:prstGeom prst="rect">
             <a:avLst/>
@@ -10411,14 +10489,188 @@
         </p:blipFill>
         <p:spPr>
           <a:xfrm>
-            <a:off x="544788" y="3239682"/>
-            <a:ext cx="585572" cy="575187"/>
+            <a:off x="434249" y="2343705"/>
+            <a:ext cx="429324" cy="421710"/>
           </a:xfrm>
           <a:prstGeom prst="rect">
             <a:avLst/>
           </a:prstGeom>
         </p:spPr>
       </p:pic>
+      <p:pic>
+        <p:nvPicPr>
+          <p:cNvPr id="12" name="Picture 11" descr="Check Mark &lt;strong&gt;Tick&lt;/strong&gt; · Free vector graphic on Pixabay"/>
+          <p:cNvPicPr>
+            <a:picLocks noChangeAspect="1"/>
+          </p:cNvPicPr>
+          <p:nvPr/>
+        </p:nvPicPr>
+        <p:blipFill>
+          <a:blip r:embed="rId3">
+            <a:extLst>
+              <a:ext uri="{28A0092B-C50C-407E-A947-70E740481C1C}">
+                <a14:useLocalDpi xmlns:a14="http://schemas.microsoft.com/office/drawing/2010/main" val="0"/>
+              </a:ext>
+            </a:extLst>
+          </a:blip>
+          <a:stretch>
+            <a:fillRect/>
+          </a:stretch>
+        </p:blipFill>
+        <p:spPr>
+          <a:xfrm>
+            <a:off x="413250" y="3111644"/>
+            <a:ext cx="450323" cy="442336"/>
+          </a:xfrm>
+          <a:prstGeom prst="rect">
+            <a:avLst/>
+          </a:prstGeom>
+        </p:spPr>
+      </p:pic>
+      <p:sp>
+        <p:nvSpPr>
+          <p:cNvPr id="5" name="Oval 4"/>
+          <p:cNvSpPr/>
+          <p:nvPr/>
+        </p:nvSpPr>
+        <p:spPr>
+          <a:xfrm>
+            <a:off x="633984" y="4194048"/>
+            <a:ext cx="134112" cy="207264"/>
+          </a:xfrm>
+          <a:prstGeom prst="ellipse">
+            <a:avLst/>
+          </a:prstGeom>
+          <a:solidFill>
+            <a:srgbClr val="FF0000"/>
+          </a:solidFill>
+          <a:ln>
+            <a:solidFill>
+              <a:srgbClr val="FF0000"/>
+            </a:solidFill>
+          </a:ln>
+        </p:spPr>
+        <p:style>
+          <a:lnRef idx="2">
+            <a:schemeClr val="accent1">
+              <a:shade val="50000"/>
+            </a:schemeClr>
+          </a:lnRef>
+          <a:fillRef idx="1">
+            <a:schemeClr val="accent1"/>
+          </a:fillRef>
+          <a:effectRef idx="0">
+            <a:schemeClr val="accent1"/>
+          </a:effectRef>
+          <a:fontRef idx="minor">
+            <a:schemeClr val="lt1"/>
+          </a:fontRef>
+        </p:style>
+        <p:txBody>
+          <a:bodyPr rtlCol="0" anchor="ctr"/>
+          <a:lstStyle/>
+          <a:p>
+            <a:pPr algn="ctr"/>
+            <a:endParaRPr lang="en-US"/>
+          </a:p>
+        </p:txBody>
+      </p:sp>
+      <p:sp>
+        <p:nvSpPr>
+          <p:cNvPr id="13" name="Oval 12"/>
+          <p:cNvSpPr/>
+          <p:nvPr/>
+        </p:nvSpPr>
+        <p:spPr>
+          <a:xfrm>
+            <a:off x="619733" y="5106930"/>
+            <a:ext cx="134112" cy="207264"/>
+          </a:xfrm>
+          <a:prstGeom prst="ellipse">
+            <a:avLst/>
+          </a:prstGeom>
+          <a:solidFill>
+            <a:srgbClr val="FF0000"/>
+          </a:solidFill>
+          <a:ln>
+            <a:solidFill>
+              <a:srgbClr val="FF0000"/>
+            </a:solidFill>
+          </a:ln>
+        </p:spPr>
+        <p:style>
+          <a:lnRef idx="2">
+            <a:schemeClr val="accent1">
+              <a:shade val="50000"/>
+            </a:schemeClr>
+          </a:lnRef>
+          <a:fillRef idx="1">
+            <a:schemeClr val="accent1"/>
+          </a:fillRef>
+          <a:effectRef idx="0">
+            <a:schemeClr val="accent1"/>
+          </a:effectRef>
+          <a:fontRef idx="minor">
+            <a:schemeClr val="lt1"/>
+          </a:fontRef>
+        </p:style>
+        <p:txBody>
+          <a:bodyPr rtlCol="0" anchor="ctr"/>
+          <a:lstStyle/>
+          <a:p>
+            <a:pPr algn="ctr"/>
+            <a:endParaRPr lang="en-US"/>
+          </a:p>
+        </p:txBody>
+      </p:sp>
+      <p:sp>
+        <p:nvSpPr>
+          <p:cNvPr id="14" name="Oval 13"/>
+          <p:cNvSpPr/>
+          <p:nvPr/>
+        </p:nvSpPr>
+        <p:spPr>
+          <a:xfrm>
+            <a:off x="633984" y="5925312"/>
+            <a:ext cx="134112" cy="207264"/>
+          </a:xfrm>
+          <a:prstGeom prst="ellipse">
+            <a:avLst/>
+          </a:prstGeom>
+          <a:solidFill>
+            <a:srgbClr val="FF0000"/>
+          </a:solidFill>
+          <a:ln>
+            <a:solidFill>
+              <a:srgbClr val="FF0000"/>
+            </a:solidFill>
+          </a:ln>
+        </p:spPr>
+        <p:style>
+          <a:lnRef idx="2">
+            <a:schemeClr val="accent1">
+              <a:shade val="50000"/>
+            </a:schemeClr>
+          </a:lnRef>
+          <a:fillRef idx="1">
+            <a:schemeClr val="accent1"/>
+          </a:fillRef>
+          <a:effectRef idx="0">
+            <a:schemeClr val="accent1"/>
+          </a:effectRef>
+          <a:fontRef idx="minor">
+            <a:schemeClr val="lt1"/>
+          </a:fontRef>
+        </p:style>
+        <p:txBody>
+          <a:bodyPr rtlCol="0" anchor="ctr"/>
+          <a:lstStyle/>
+          <a:p>
+            <a:pPr algn="ctr"/>
+            <a:endParaRPr lang="en-US"/>
+          </a:p>
+        </p:txBody>
+      </p:sp>
     </p:spTree>
     <p:extLst>
       <p:ext uri="{BB962C8B-B14F-4D97-AF65-F5344CB8AC3E}">
@@ -10429,13 +10681,13 @@
   <p:clrMapOvr>
     <a:masterClrMapping/>
   </p:clrMapOvr>
-  <mc:AlternateContent xmlns:mc="http://schemas.openxmlformats.org/markup-compatibility/2006">
-    <mc:Choice xmlns:p14="http://schemas.microsoft.com/office/powerpoint/2010/main" Requires="p14">
+  <mc:AlternateContent xmlns:mc="http://schemas.openxmlformats.org/markup-compatibility/2006" xmlns:p14="http://schemas.microsoft.com/office/powerpoint/2010/main">
+    <mc:Choice Requires="p14">
       <p:transition spd="med" p14:dur="700">
         <p:fade/>
       </p:transition>
     </mc:Choice>
-    <mc:Fallback>
+    <mc:Fallback xmlns="">
       <p:transition spd="med">
         <p:fade/>
       </p:transition>
@@ -10645,14 +10897,36 @@
                             </p:stCondLst>
                             <p:childTnLst>
                               <p:par>
-                                <p:cTn id="20" presetID="6" presetClass="emph" presetSubtype="0" fill="hold" grpId="0" nodeType="clickEffect">
+                                <p:cTn id="20" presetID="10" presetClass="entr" presetSubtype="0" fill="hold" grpId="0" nodeType="clickEffect">
                                   <p:stCondLst>
                                     <p:cond delay="0"/>
                                   </p:stCondLst>
                                   <p:childTnLst>
-                                    <p:animScale>
+                                    <p:set>
                                       <p:cBhvr>
-                                        <p:cTn id="21" dur="2000" fill="hold"/>
+                                        <p:cTn id="21" dur="1" fill="hold">
+                                          <p:stCondLst>
+                                            <p:cond delay="0"/>
+                                          </p:stCondLst>
+                                        </p:cTn>
+                                        <p:tgtEl>
+                                          <p:spTgt spid="3">
+                                            <p:txEl>
+                                              <p:pRg st="6" end="6"/>
+                                            </p:txEl>
+                                          </p:spTgt>
+                                        </p:tgtEl>
+                                        <p:attrNameLst>
+                                          <p:attrName>style.visibility</p:attrName>
+                                        </p:attrNameLst>
+                                      </p:cBhvr>
+                                      <p:to>
+                                        <p:strVal val="visible"/>
+                                      </p:to>
+                                    </p:set>
+                                    <p:animEffect transition="in" filter="fade">
+                                      <p:cBhvr>
+                                        <p:cTn id="22" dur="500"/>
                                         <p:tgtEl>
                                           <p:spTgt spid="3">
                                             <p:txEl>
@@ -10661,8 +10935,7 @@
                                           </p:spTgt>
                                         </p:tgtEl>
                                       </p:cBhvr>
-                                      <p:by x="150000" y="150000"/>
-                                    </p:animScale>
+                                    </p:animEffect>
                                   </p:childTnLst>
                                 </p:cTn>
                               </p:par>
@@ -10673,26 +10946,148 @@
                     </p:cTn>
                   </p:par>
                   <p:par>
-                    <p:cTn id="22" fill="hold">
+                    <p:cTn id="23" fill="hold">
                       <p:stCondLst>
                         <p:cond delay="indefinite"/>
                       </p:stCondLst>
                       <p:childTnLst>
                         <p:par>
-                          <p:cTn id="23" fill="hold">
+                          <p:cTn id="24" fill="hold">
                             <p:stCondLst>
                               <p:cond delay="0"/>
                             </p:stCondLst>
                             <p:childTnLst>
                               <p:par>
-                                <p:cTn id="24" presetID="1" presetClass="entr" presetSubtype="0" fill="hold" nodeType="clickEffect">
+                                <p:cTn id="25" presetID="10" presetClass="entr" presetSubtype="0" fill="hold" grpId="0" nodeType="clickEffect">
                                   <p:stCondLst>
                                     <p:cond delay="0"/>
                                   </p:stCondLst>
                                   <p:childTnLst>
                                     <p:set>
                                       <p:cBhvr>
-                                        <p:cTn id="25" dur="1" fill="hold">
+                                        <p:cTn id="26" dur="1" fill="hold">
+                                          <p:stCondLst>
+                                            <p:cond delay="0"/>
+                                          </p:stCondLst>
+                                        </p:cTn>
+                                        <p:tgtEl>
+                                          <p:spTgt spid="3">
+                                            <p:txEl>
+                                              <p:pRg st="8" end="8"/>
+                                            </p:txEl>
+                                          </p:spTgt>
+                                        </p:tgtEl>
+                                        <p:attrNameLst>
+                                          <p:attrName>style.visibility</p:attrName>
+                                        </p:attrNameLst>
+                                      </p:cBhvr>
+                                      <p:to>
+                                        <p:strVal val="visible"/>
+                                      </p:to>
+                                    </p:set>
+                                    <p:animEffect transition="in" filter="fade">
+                                      <p:cBhvr>
+                                        <p:cTn id="27" dur="500"/>
+                                        <p:tgtEl>
+                                          <p:spTgt spid="3">
+                                            <p:txEl>
+                                              <p:pRg st="8" end="8"/>
+                                            </p:txEl>
+                                          </p:spTgt>
+                                        </p:tgtEl>
+                                      </p:cBhvr>
+                                    </p:animEffect>
+                                  </p:childTnLst>
+                                </p:cTn>
+                              </p:par>
+                            </p:childTnLst>
+                          </p:cTn>
+                        </p:par>
+                      </p:childTnLst>
+                    </p:cTn>
+                  </p:par>
+                  <p:par>
+                    <p:cTn id="28" fill="hold">
+                      <p:stCondLst>
+                        <p:cond delay="indefinite"/>
+                      </p:stCondLst>
+                      <p:childTnLst>
+                        <p:par>
+                          <p:cTn id="29" fill="hold">
+                            <p:stCondLst>
+                              <p:cond delay="0"/>
+                            </p:stCondLst>
+                            <p:childTnLst>
+                              <p:par>
+                                <p:cTn id="30" presetID="10" presetClass="entr" presetSubtype="0" fill="hold" grpId="0" nodeType="clickEffect">
+                                  <p:stCondLst>
+                                    <p:cond delay="0"/>
+                                  </p:stCondLst>
+                                  <p:childTnLst>
+                                    <p:set>
+                                      <p:cBhvr>
+                                        <p:cTn id="31" dur="1" fill="hold">
+                                          <p:stCondLst>
+                                            <p:cond delay="0"/>
+                                          </p:stCondLst>
+                                        </p:cTn>
+                                        <p:tgtEl>
+                                          <p:spTgt spid="3">
+                                            <p:txEl>
+                                              <p:pRg st="10" end="10"/>
+                                            </p:txEl>
+                                          </p:spTgt>
+                                        </p:tgtEl>
+                                        <p:attrNameLst>
+                                          <p:attrName>style.visibility</p:attrName>
+                                        </p:attrNameLst>
+                                      </p:cBhvr>
+                                      <p:to>
+                                        <p:strVal val="visible"/>
+                                      </p:to>
+                                    </p:set>
+                                    <p:animEffect transition="in" filter="fade">
+                                      <p:cBhvr>
+                                        <p:cTn id="32" dur="500"/>
+                                        <p:tgtEl>
+                                          <p:spTgt spid="3">
+                                            <p:txEl>
+                                              <p:pRg st="10" end="10"/>
+                                            </p:txEl>
+                                          </p:spTgt>
+                                        </p:tgtEl>
+                                      </p:cBhvr>
+                                    </p:animEffect>
+                                  </p:childTnLst>
+                                </p:cTn>
+                              </p:par>
+                            </p:childTnLst>
+                          </p:cTn>
+                        </p:par>
+                      </p:childTnLst>
+                    </p:cTn>
+                  </p:par>
+                  <p:par>
+                    <p:cTn id="33" fill="hold">
+                      <p:stCondLst>
+                        <p:cond delay="indefinite"/>
+                      </p:stCondLst>
+                      <p:childTnLst>
+                        <p:par>
+                          <p:cTn id="34" fill="hold">
+                            <p:stCondLst>
+                              <p:cond delay="0"/>
+                            </p:stCondLst>
+                            <p:childTnLst>
+                              <p:par>
+                                <p:cTn id="35" presetID="1" presetClass="entr" presetSubtype="0" fill="hold" nodeType="clickEffect">
+                                  <p:stCondLst>
+                                    <p:cond delay="0"/>
+                                  </p:stCondLst>
+                                  <p:childTnLst>
+                                    <p:set>
+                                      <p:cBhvr>
+                                        <p:cTn id="36" dur="1" fill="hold">
                                           <p:stCondLst>
                                             <p:cond delay="0"/>
                                           </p:stCondLst>
@@ -10718,26 +11113,26 @@
                     </p:cTn>
                   </p:par>
                   <p:par>
-                    <p:cTn id="26" fill="hold">
+                    <p:cTn id="37" fill="hold">
                       <p:stCondLst>
                         <p:cond delay="indefinite"/>
                       </p:stCondLst>
                       <p:childTnLst>
                         <p:par>
-                          <p:cTn id="27" fill="hold">
+                          <p:cTn id="38" fill="hold">
                             <p:stCondLst>
                               <p:cond delay="0"/>
                             </p:stCondLst>
                             <p:childTnLst>
                               <p:par>
-                                <p:cTn id="28" presetID="1" presetClass="entr" presetSubtype="0" fill="hold" nodeType="clickEffect">
+                                <p:cTn id="39" presetID="1" presetClass="entr" presetSubtype="0" fill="hold" nodeType="clickEffect">
                                   <p:stCondLst>
                                     <p:cond delay="0"/>
                                   </p:stCondLst>
                                   <p:childTnLst>
                                     <p:set>
                                       <p:cBhvr>
-                                        <p:cTn id="29" dur="1" fill="hold">
+                                        <p:cTn id="40" dur="1" fill="hold">
                                           <p:stCondLst>
                                             <p:cond delay="0"/>
                                           </p:stCondLst>
@@ -10763,32 +11158,32 @@
                     </p:cTn>
                   </p:par>
                   <p:par>
-                    <p:cTn id="30" fill="hold">
+                    <p:cTn id="41" fill="hold">
                       <p:stCondLst>
                         <p:cond delay="indefinite"/>
                       </p:stCondLst>
                       <p:childTnLst>
                         <p:par>
-                          <p:cTn id="31" fill="hold">
+                          <p:cTn id="42" fill="hold">
                             <p:stCondLst>
                               <p:cond delay="0"/>
                             </p:stCondLst>
                             <p:childTnLst>
                               <p:par>
-                                <p:cTn id="32" presetID="1" presetClass="entr" presetSubtype="0" fill="hold" nodeType="clickEffect">
+                                <p:cTn id="43" presetID="1" presetClass="entr" presetSubtype="0" fill="hold" nodeType="clickEffect">
                                   <p:stCondLst>
                                     <p:cond delay="0"/>
                                   </p:stCondLst>
                                   <p:childTnLst>
                                     <p:set>
                                       <p:cBhvr>
-                                        <p:cTn id="33" dur="1" fill="hold">
+                                        <p:cTn id="44" dur="1" fill="hold">
                                           <p:stCondLst>
                                             <p:cond delay="0"/>
                                           </p:stCondLst>
                                         </p:cTn>
                                         <p:tgtEl>
-                                          <p:spTgt spid="9"/>
+                                          <p:spTgt spid="12"/>
                                         </p:tgtEl>
                                         <p:attrNameLst>
                                           <p:attrName>style.visibility</p:attrName>
@@ -10808,26 +11203,161 @@
                     </p:cTn>
                   </p:par>
                   <p:par>
-                    <p:cTn id="34" fill="hold">
+                    <p:cTn id="45" fill="hold">
                       <p:stCondLst>
                         <p:cond delay="indefinite"/>
                       </p:stCondLst>
                       <p:childTnLst>
                         <p:par>
-                          <p:cTn id="35" fill="hold">
+                          <p:cTn id="46" fill="hold">
                             <p:stCondLst>
                               <p:cond delay="0"/>
                             </p:stCondLst>
                             <p:childTnLst>
                               <p:par>
-                                <p:cTn id="36" presetID="22" presetClass="entr" presetSubtype="4" fill="hold" grpId="0" nodeType="clickEffect">
+                                <p:cTn id="47" presetID="1" presetClass="entr" presetSubtype="0" fill="hold" grpId="0" nodeType="clickEffect">
                                   <p:stCondLst>
                                     <p:cond delay="0"/>
                                   </p:stCondLst>
                                   <p:childTnLst>
                                     <p:set>
                                       <p:cBhvr>
-                                        <p:cTn id="37" dur="1" fill="hold">
+                                        <p:cTn id="48" dur="1" fill="hold">
+                                          <p:stCondLst>
+                                            <p:cond delay="0"/>
+                                          </p:stCondLst>
+                                        </p:cTn>
+                                        <p:tgtEl>
+                                          <p:spTgt spid="5"/>
+                                        </p:tgtEl>
+                                        <p:attrNameLst>
+                                          <p:attrName>style.visibility</p:attrName>
+                                        </p:attrNameLst>
+                                      </p:cBhvr>
+                                      <p:to>
+                                        <p:strVal val="visible"/>
+                                      </p:to>
+                                    </p:set>
+                                  </p:childTnLst>
+                                </p:cTn>
+                              </p:par>
+                            </p:childTnLst>
+                          </p:cTn>
+                        </p:par>
+                      </p:childTnLst>
+                    </p:cTn>
+                  </p:par>
+                  <p:par>
+                    <p:cTn id="49" fill="hold">
+                      <p:stCondLst>
+                        <p:cond delay="indefinite"/>
+                      </p:stCondLst>
+                      <p:childTnLst>
+                        <p:par>
+                          <p:cTn id="50" fill="hold">
+                            <p:stCondLst>
+                              <p:cond delay="0"/>
+                            </p:stCondLst>
+                            <p:childTnLst>
+                              <p:par>
+                                <p:cTn id="51" presetID="1" presetClass="entr" presetSubtype="0" fill="hold" grpId="0" nodeType="clickEffect">
+                                  <p:stCondLst>
+                                    <p:cond delay="0"/>
+                                  </p:stCondLst>
+                                  <p:childTnLst>
+                                    <p:set>
+                                      <p:cBhvr>
+                                        <p:cTn id="52" dur="1" fill="hold">
+                                          <p:stCondLst>
+                                            <p:cond delay="0"/>
+                                          </p:stCondLst>
+                                        </p:cTn>
+                                        <p:tgtEl>
+                                          <p:spTgt spid="13"/>
+                                        </p:tgtEl>
+                                        <p:attrNameLst>
+                                          <p:attrName>style.visibility</p:attrName>
+                                        </p:attrNameLst>
+                                      </p:cBhvr>
+                                      <p:to>
+                                        <p:strVal val="visible"/>
+                                      </p:to>
+                                    </p:set>
+                                  </p:childTnLst>
+                                </p:cTn>
+                              </p:par>
+                            </p:childTnLst>
+                          </p:cTn>
+                        </p:par>
+                      </p:childTnLst>
+                    </p:cTn>
+                  </p:par>
+                  <p:par>
+                    <p:cTn id="53" fill="hold">
+                      <p:stCondLst>
+                        <p:cond delay="indefinite"/>
+                      </p:stCondLst>
+                      <p:childTnLst>
+                        <p:par>
+                          <p:cTn id="54" fill="hold">
+                            <p:stCondLst>
+                              <p:cond delay="0"/>
+                            </p:stCondLst>
+                            <p:childTnLst>
+                              <p:par>
+                                <p:cTn id="55" presetID="1" presetClass="entr" presetSubtype="0" fill="hold" grpId="0" nodeType="clickEffect">
+                                  <p:stCondLst>
+                                    <p:cond delay="0"/>
+                                  </p:stCondLst>
+                                  <p:childTnLst>
+                                    <p:set>
+                                      <p:cBhvr>
+                                        <p:cTn id="56" dur="1" fill="hold">
+                                          <p:stCondLst>
+                                            <p:cond delay="0"/>
+                                          </p:stCondLst>
+                                        </p:cTn>
+                                        <p:tgtEl>
+                                          <p:spTgt spid="14"/>
+                                        </p:tgtEl>
+                                        <p:attrNameLst>
+                                          <p:attrName>style.visibility</p:attrName>
+                                        </p:attrNameLst>
+                                      </p:cBhvr>
+                                      <p:to>
+                                        <p:strVal val="visible"/>
+                                      </p:to>
+                                    </p:set>
+                                  </p:childTnLst>
+                                </p:cTn>
+                              </p:par>
+                            </p:childTnLst>
+                          </p:cTn>
+                        </p:par>
+                      </p:childTnLst>
+                    </p:cTn>
+                  </p:par>
+                  <p:par>
+                    <p:cTn id="57" fill="hold">
+                      <p:stCondLst>
+                        <p:cond delay="indefinite"/>
+                      </p:stCondLst>
+                      <p:childTnLst>
+                        <p:par>
+                          <p:cTn id="58" fill="hold">
+                            <p:stCondLst>
+                              <p:cond delay="0"/>
+                            </p:stCondLst>
+                            <p:childTnLst>
+                              <p:par>
+                                <p:cTn id="59" presetID="6" presetClass="entr" presetSubtype="16" fill="hold" grpId="0" nodeType="clickEffect">
+                                  <p:stCondLst>
+                                    <p:cond delay="0"/>
+                                  </p:stCondLst>
+                                  <p:childTnLst>
+                                    <p:set>
+                                      <p:cBhvr>
+                                        <p:cTn id="60" dur="1" fill="hold">
                                           <p:stCondLst>
                                             <p:cond delay="0"/>
                                           </p:stCondLst>
@@ -10843,9 +11373,9 @@
                                         <p:strVal val="visible"/>
                                       </p:to>
                                     </p:set>
-                                    <p:animEffect transition="in" filter="wipe(down)">
+                                    <p:animEffect transition="in" filter="circle(in)">
                                       <p:cBhvr>
-                                        <p:cTn id="38" dur="500"/>
+                                        <p:cTn id="61" dur="2000"/>
                                         <p:tgtEl>
                                           <p:spTgt spid="7"/>
                                         </p:tgtEl>
@@ -10886,6 +11416,9 @@
       <p:bldGraphic spid="7" grpId="0">
         <p:bldAsOne/>
       </p:bldGraphic>
+      <p:bldP spid="5" grpId="0" animBg="1"/>
+      <p:bldP spid="13" grpId="0" animBg="1"/>
+      <p:bldP spid="14" grpId="0" animBg="1"/>
     </p:bldLst>
   </p:timing>
 </p:sld>
@@ -11571,13 +12104,13 @@
   <p:clrMapOvr>
     <a:masterClrMapping/>
   </p:clrMapOvr>
-  <mc:AlternateContent xmlns:mc="http://schemas.openxmlformats.org/markup-compatibility/2006">
-    <mc:Choice xmlns:p14="http://schemas.microsoft.com/office/powerpoint/2010/main" Requires="p14">
+  <mc:AlternateContent xmlns:mc="http://schemas.openxmlformats.org/markup-compatibility/2006" xmlns:p14="http://schemas.microsoft.com/office/powerpoint/2010/main">
+    <mc:Choice Requires="p14">
       <p:transition spd="med" p14:dur="700">
         <p:fade/>
       </p:transition>
     </mc:Choice>
-    <mc:Fallback>
+    <mc:Fallback xmlns="">
       <p:transition spd="med">
         <p:fade/>
       </p:transition>

</xml_diff>